<commit_message>
another update for cpptechniques
</commit_message>
<xml_diff>
--- a/cppTechniques/C++ Techniques 01.pptx
+++ b/cppTechniques/C++ Techniques 01.pptx
@@ -35,12 +35,21 @@
     <p:sldId id="278" r:id="rId29"/>
     <p:sldId id="290" r:id="rId30"/>
     <p:sldId id="291" r:id="rId31"/>
-    <p:sldId id="294" r:id="rId32"/>
-    <p:sldId id="293" r:id="rId33"/>
-    <p:sldId id="273" r:id="rId34"/>
-    <p:sldId id="276" r:id="rId35"/>
-    <p:sldId id="280" r:id="rId36"/>
-    <p:sldId id="281" r:id="rId37"/>
+    <p:sldId id="302" r:id="rId32"/>
+    <p:sldId id="297" r:id="rId33"/>
+    <p:sldId id="298" r:id="rId34"/>
+    <p:sldId id="299" r:id="rId35"/>
+    <p:sldId id="300" r:id="rId36"/>
+    <p:sldId id="301" r:id="rId37"/>
+    <p:sldId id="304" r:id="rId38"/>
+    <p:sldId id="303" r:id="rId39"/>
+    <p:sldId id="293" r:id="rId40"/>
+    <p:sldId id="273" r:id="rId41"/>
+    <p:sldId id="276" r:id="rId42"/>
+    <p:sldId id="280" r:id="rId43"/>
+    <p:sldId id="281" r:id="rId44"/>
+    <p:sldId id="295" r:id="rId45"/>
+    <p:sldId id="296" r:id="rId46"/>
   </p:sldIdLst>
   <p:sldSz cx="12192000" cy="6858000"/>
   <p:notesSz cx="6858000" cy="9144000"/>
@@ -5458,8 +5467,12 @@
           <a:lstStyle/>
           <a:p>
             <a:r>
-              <a:rPr lang="sv-SE" dirty="0" smtClean="0"/>
-              <a:t>Let’s see a demo. (InheritanceDemo)</a:t>
+              <a:rPr lang="en-US" dirty="0" smtClean="0"/>
+              <a:t>If not virtual… l</a:t>
+            </a:r>
+            <a:r>
+              <a:rPr lang="sv-SE" dirty="0" smtClean="0"/>
+              <a:t>et’s see a demo. (InheritanceDemo)</a:t>
             </a:r>
           </a:p>
           <a:p>
@@ -5808,7 +5821,7 @@
         <p:spPr/>
         <p:txBody>
           <a:bodyPr>
-            <a:normAutofit fontScale="92500" lnSpcReduction="20000"/>
+            <a:normAutofit fontScale="85000" lnSpcReduction="20000"/>
           </a:bodyPr>
           <a:lstStyle/>
           <a:p>
@@ -5951,6 +5964,16 @@
             <a:pPr marL="0" indent="0">
               <a:buNone/>
             </a:pPr>
+            <a:endParaRPr lang="sv-SE" dirty="0" smtClean="0"/>
+          </a:p>
+          <a:p>
+            <a:pPr marL="0" indent="0">
+              <a:buNone/>
+            </a:pPr>
+            <a:r>
+              <a:rPr lang="sv-SE" dirty="0" smtClean="0"/>
+              <a:t>Derived d(”base”, ”derived”);</a:t>
+            </a:r>
             <a:endParaRPr lang="sv-SE" dirty="0"/>
           </a:p>
           <a:p>
@@ -6425,7 +6448,7 @@
                                         <p:tgtEl>
                                           <p:spTgt spid="3">
                                             <p:txEl>
-                                              <p:pRg st="9" end="9"/>
+                                              <p:pRg st="10" end="10"/>
                                             </p:txEl>
                                           </p:spTgt>
                                         </p:tgtEl>
@@ -7442,8 +7465,8 @@
           <a:lstStyle/>
           <a:p>
             <a:r>
-              <a:rPr lang="sv-SE" dirty="0" smtClean="0"/>
-              <a:t>Self Assignment</a:t>
+              <a:rPr lang="en-US" dirty="0" smtClean="0"/>
+              <a:t>Simple Operation Class</a:t>
             </a:r>
             <a:endParaRPr lang="en-US" dirty="0"/>
           </a:p>
@@ -7461,66 +7484,183 @@
         </p:nvSpPr>
         <p:spPr/>
         <p:txBody>
-          <a:bodyPr/>
-          <a:lstStyle/>
-          <a:p>
-            <a:r>
-              <a:rPr lang="sv-SE" dirty="0" smtClean="0"/>
-              <a:t>Class A {...}</a:t>
-            </a:r>
-          </a:p>
-          <a:p>
-            <a:pPr marL="457200" lvl="1" indent="0">
-              <a:buNone/>
-            </a:pPr>
-            <a:r>
-              <a:rPr lang="sv-SE" dirty="0" smtClean="0"/>
-              <a:t>A a;</a:t>
-            </a:r>
-            <a:r>
-              <a:rPr lang="en-US" dirty="0" smtClean="0"/>
-              <a:t> </a:t>
-            </a:r>
-          </a:p>
-          <a:p>
-            <a:pPr marL="457200" lvl="1" indent="0">
-              <a:buNone/>
-            </a:pPr>
-            <a:r>
-              <a:rPr lang="en-US" dirty="0"/>
-              <a:t>a</a:t>
-            </a:r>
-            <a:r>
-              <a:rPr lang="en-US" dirty="0" smtClean="0"/>
-              <a:t> = a;</a:t>
-            </a:r>
-            <a:endParaRPr lang="sv-SE" dirty="0"/>
-          </a:p>
-          <a:p>
-            <a:pPr marL="0" indent="0">
-              <a:buNone/>
-            </a:pPr>
-            <a:r>
-              <a:rPr lang="sv-SE" dirty="0" smtClean="0"/>
-              <a:t>Hmm... Do we need to handle it?</a:t>
-            </a:r>
-          </a:p>
-          <a:p>
-            <a:pPr marL="0" indent="0">
-              <a:buNone/>
-            </a:pPr>
-            <a:r>
-              <a:rPr lang="sv-SE" dirty="0" smtClean="0"/>
-              <a:t>Yes.</a:t>
-            </a:r>
-            <a:endParaRPr lang="en-US" dirty="0" smtClean="0"/>
+          <a:bodyPr>
+            <a:normAutofit fontScale="92500"/>
+          </a:bodyPr>
+          <a:lstStyle/>
+          <a:p>
+            <a:pPr marL="0" indent="0">
+              <a:buNone/>
+            </a:pPr>
+            <a:r>
+              <a:rPr lang="en-US" dirty="0" smtClean="0"/>
+              <a:t>class Operation {</a:t>
+            </a:r>
+          </a:p>
+          <a:p>
+            <a:pPr marL="0" indent="0">
+              <a:buNone/>
+            </a:pPr>
+            <a:r>
+              <a:rPr lang="en-US" dirty="0" smtClean="0"/>
+              <a:t>private:</a:t>
+            </a:r>
+          </a:p>
+          <a:p>
+            <a:pPr marL="0" indent="0">
+              <a:buNone/>
+            </a:pPr>
+            <a:r>
+              <a:rPr lang="en-US" dirty="0" smtClean="0"/>
+              <a:t>    string* </a:t>
+            </a:r>
+            <a:r>
+              <a:rPr lang="en-US" dirty="0" err="1" smtClean="0"/>
+              <a:t>pSecret</a:t>
+            </a:r>
+            <a:r>
+              <a:rPr lang="en-US" dirty="0" smtClean="0"/>
+              <a:t>;</a:t>
+            </a:r>
+          </a:p>
+          <a:p>
+            <a:pPr marL="0" indent="0">
+              <a:buNone/>
+            </a:pPr>
+            <a:r>
+              <a:rPr lang="en-US" dirty="0" smtClean="0"/>
+              <a:t>    Operation() : </a:t>
+            </a:r>
+            <a:r>
+              <a:rPr lang="en-US" dirty="0" err="1" smtClean="0"/>
+              <a:t>pSecret</a:t>
+            </a:r>
+            <a:r>
+              <a:rPr lang="en-US" dirty="0" smtClean="0"/>
+              <a:t>(</a:t>
+            </a:r>
+            <a:r>
+              <a:rPr lang="en-US" dirty="0" err="1" smtClean="0"/>
+              <a:t>nullptr</a:t>
+            </a:r>
+            <a:r>
+              <a:rPr lang="en-US" dirty="0" smtClean="0"/>
+              <a:t>) {}</a:t>
+            </a:r>
+          </a:p>
+          <a:p>
+            <a:pPr marL="0" indent="0">
+              <a:buNone/>
+            </a:pPr>
+            <a:r>
+              <a:rPr lang="en-US" dirty="0" smtClean="0"/>
+              <a:t>public:</a:t>
+            </a:r>
+          </a:p>
+          <a:p>
+            <a:pPr marL="0" indent="0">
+              <a:buNone/>
+            </a:pPr>
+            <a:r>
+              <a:rPr lang="en-US" dirty="0" smtClean="0"/>
+              <a:t>    explicit Operation(</a:t>
+            </a:r>
+            <a:r>
+              <a:rPr lang="en-US" dirty="0" err="1" smtClean="0"/>
+              <a:t>const</a:t>
+            </a:r>
+            <a:r>
+              <a:rPr lang="en-US" dirty="0" smtClean="0"/>
+              <a:t> string&amp; secret) : </a:t>
+            </a:r>
+            <a:r>
+              <a:rPr lang="en-US" dirty="0" err="1" smtClean="0"/>
+              <a:t>pSecret</a:t>
+            </a:r>
+            <a:r>
+              <a:rPr lang="en-US" dirty="0" smtClean="0"/>
+              <a:t>(new string(secret)) {}</a:t>
+            </a:r>
+          </a:p>
+          <a:p>
+            <a:pPr marL="0" indent="0">
+              <a:buNone/>
+            </a:pPr>
+            <a:r>
+              <a:rPr lang="en-US" dirty="0" smtClean="0"/>
+              <a:t>    Operation(</a:t>
+            </a:r>
+            <a:r>
+              <a:rPr lang="en-US" dirty="0" err="1" smtClean="0"/>
+              <a:t>const</a:t>
+            </a:r>
+            <a:r>
+              <a:rPr lang="en-US" dirty="0" smtClean="0"/>
+              <a:t> Operation&amp; </a:t>
+            </a:r>
+            <a:r>
+              <a:rPr lang="en-US" dirty="0" err="1" smtClean="0"/>
+              <a:t>rhs</a:t>
+            </a:r>
+            <a:r>
+              <a:rPr lang="en-US" dirty="0" smtClean="0"/>
+              <a:t>) : </a:t>
+            </a:r>
+            <a:r>
+              <a:rPr lang="en-US" dirty="0" err="1" smtClean="0"/>
+              <a:t>pSecret</a:t>
+            </a:r>
+            <a:r>
+              <a:rPr lang="en-US" dirty="0" smtClean="0"/>
+              <a:t>(new string(*</a:t>
+            </a:r>
+            <a:r>
+              <a:rPr lang="en-US" dirty="0" err="1" smtClean="0"/>
+              <a:t>rhs.pSecret</a:t>
+            </a:r>
+            <a:r>
+              <a:rPr lang="en-US" dirty="0" smtClean="0"/>
+              <a:t>)) {}</a:t>
+            </a:r>
+          </a:p>
+          <a:p>
+            <a:pPr marL="0" indent="0">
+              <a:buNone/>
+            </a:pPr>
+            <a:r>
+              <a:rPr lang="en-US" dirty="0" smtClean="0"/>
+              <a:t>    ~Operation() {delete </a:t>
+            </a:r>
+            <a:r>
+              <a:rPr lang="en-US" dirty="0" err="1" smtClean="0"/>
+              <a:t>pSecret</a:t>
+            </a:r>
+            <a:r>
+              <a:rPr lang="en-US" dirty="0" smtClean="0"/>
+              <a:t>;}</a:t>
+            </a:r>
+          </a:p>
+          <a:p>
+            <a:pPr marL="0" indent="0">
+              <a:buNone/>
+            </a:pPr>
+            <a:r>
+              <a:rPr lang="en-US" dirty="0" smtClean="0"/>
+              <a:t>};</a:t>
+            </a:r>
+          </a:p>
+          <a:p>
+            <a:pPr marL="0" indent="0">
+              <a:buNone/>
+            </a:pPr>
+            <a:endParaRPr lang="en-US" dirty="0"/>
           </a:p>
         </p:txBody>
       </p:sp>
     </p:spTree>
     <p:extLst>
       <p:ext uri="{BB962C8B-B14F-4D97-AF65-F5344CB8AC3E}">
-        <p14:creationId xmlns:p14="http://schemas.microsoft.com/office/powerpoint/2010/main" val="3749734458"/>
+        <p14:creationId xmlns:p14="http://schemas.microsoft.com/office/powerpoint/2010/main" val="571287345"/>
       </p:ext>
     </p:extLst>
   </p:cSld>
@@ -7569,7 +7709,11 @@
           <a:bodyPr/>
           <a:lstStyle/>
           <a:p>
-            <a:endParaRPr lang="en-US"/>
+            <a:r>
+              <a:rPr lang="en-US" dirty="0" smtClean="0"/>
+              <a:t>Assignment Operator Works?</a:t>
+            </a:r>
+            <a:endParaRPr lang="en-US" dirty="0"/>
           </a:p>
         </p:txBody>
       </p:sp>
@@ -7585,17 +7729,175 @@
         </p:nvSpPr>
         <p:spPr/>
         <p:txBody>
-          <a:bodyPr/>
-          <a:lstStyle/>
-          <a:p>
-            <a:endParaRPr lang="en-US"/>
+          <a:bodyPr>
+            <a:normAutofit fontScale="77500" lnSpcReduction="20000"/>
+          </a:bodyPr>
+          <a:lstStyle/>
+          <a:p>
+            <a:pPr marL="0" indent="0">
+              <a:buNone/>
+            </a:pPr>
+            <a:r>
+              <a:rPr lang="en-US" dirty="0" smtClean="0"/>
+              <a:t>Operation&amp; operator=(</a:t>
+            </a:r>
+            <a:r>
+              <a:rPr lang="en-US" dirty="0" err="1" smtClean="0"/>
+              <a:t>const</a:t>
+            </a:r>
+            <a:r>
+              <a:rPr lang="en-US" dirty="0" smtClean="0"/>
+              <a:t> Operation&amp; </a:t>
+            </a:r>
+            <a:r>
+              <a:rPr lang="en-US" dirty="0" err="1" smtClean="0"/>
+              <a:t>rhs</a:t>
+            </a:r>
+            <a:r>
+              <a:rPr lang="en-US" dirty="0" smtClean="0"/>
+              <a:t>) {</a:t>
+            </a:r>
+          </a:p>
+          <a:p>
+            <a:pPr marL="0" indent="0">
+              <a:buNone/>
+            </a:pPr>
+            <a:r>
+              <a:rPr lang="en-US" dirty="0" smtClean="0"/>
+              <a:t>        delete </a:t>
+            </a:r>
+            <a:r>
+              <a:rPr lang="en-US" dirty="0" err="1" smtClean="0"/>
+              <a:t>pSecret</a:t>
+            </a:r>
+            <a:r>
+              <a:rPr lang="en-US" dirty="0" smtClean="0"/>
+              <a:t>;</a:t>
+            </a:r>
+          </a:p>
+          <a:p>
+            <a:pPr marL="0" indent="0">
+              <a:buNone/>
+            </a:pPr>
+            <a:r>
+              <a:rPr lang="en-US" dirty="0" smtClean="0"/>
+              <a:t>        </a:t>
+            </a:r>
+            <a:r>
+              <a:rPr lang="en-US" dirty="0" err="1" smtClean="0"/>
+              <a:t>pSecret</a:t>
+            </a:r>
+            <a:r>
+              <a:rPr lang="en-US" dirty="0" smtClean="0"/>
+              <a:t> = new string(*</a:t>
+            </a:r>
+            <a:r>
+              <a:rPr lang="en-US" dirty="0" err="1" smtClean="0"/>
+              <a:t>rhs.pSecret</a:t>
+            </a:r>
+            <a:r>
+              <a:rPr lang="en-US" dirty="0" smtClean="0"/>
+              <a:t>);</a:t>
+            </a:r>
+          </a:p>
+          <a:p>
+            <a:pPr marL="0" indent="0">
+              <a:buNone/>
+            </a:pPr>
+            <a:r>
+              <a:rPr lang="en-US" dirty="0" smtClean="0"/>
+              <a:t>        return *this;</a:t>
+            </a:r>
+          </a:p>
+          <a:p>
+            <a:pPr marL="0" indent="0">
+              <a:buNone/>
+            </a:pPr>
+            <a:r>
+              <a:rPr lang="en-US" dirty="0" smtClean="0"/>
+              <a:t>}</a:t>
+            </a:r>
+          </a:p>
+          <a:p>
+            <a:pPr marL="0" indent="0">
+              <a:buNone/>
+            </a:pPr>
+            <a:endParaRPr lang="en-US" dirty="0" smtClean="0"/>
+          </a:p>
+          <a:p>
+            <a:pPr marL="0" indent="0">
+              <a:buNone/>
+            </a:pPr>
+            <a:r>
+              <a:rPr lang="en-US" dirty="0" smtClean="0"/>
+              <a:t>Operation a("</a:t>
+            </a:r>
+            <a:r>
+              <a:rPr lang="en-US" dirty="0" err="1" smtClean="0"/>
+              <a:t>secretA</a:t>
+            </a:r>
+            <a:r>
+              <a:rPr lang="en-US" dirty="0" smtClean="0"/>
+              <a:t>");</a:t>
+            </a:r>
+          </a:p>
+          <a:p>
+            <a:pPr marL="0" indent="0">
+              <a:buNone/>
+            </a:pPr>
+            <a:r>
+              <a:rPr lang="en-US" dirty="0" smtClean="0"/>
+              <a:t>Operation b("</a:t>
+            </a:r>
+            <a:r>
+              <a:rPr lang="en-US" dirty="0" err="1" smtClean="0"/>
+              <a:t>secretB</a:t>
+            </a:r>
+            <a:r>
+              <a:rPr lang="en-US" dirty="0" smtClean="0"/>
+              <a:t>");</a:t>
+            </a:r>
+          </a:p>
+          <a:p>
+            <a:pPr marL="0" indent="0">
+              <a:buNone/>
+            </a:pPr>
+            <a:r>
+              <a:rPr lang="en-US" dirty="0" smtClean="0"/>
+              <a:t>a = b;</a:t>
+            </a:r>
+          </a:p>
+          <a:p>
+            <a:pPr marL="0" indent="0">
+              <a:buNone/>
+            </a:pPr>
+            <a:r>
+              <a:rPr lang="en-US" dirty="0" smtClean="0"/>
+              <a:t>b = b;  //?</a:t>
+            </a:r>
+          </a:p>
+          <a:p>
+            <a:pPr marL="0" indent="0">
+              <a:buNone/>
+            </a:pPr>
+            <a:endParaRPr lang="en-US" dirty="0" smtClean="0"/>
+          </a:p>
+          <a:p>
+            <a:pPr marL="0" indent="0">
+              <a:buNone/>
+            </a:pPr>
+            <a:r>
+              <a:rPr lang="en-US" dirty="0" smtClean="0"/>
+              <a:t>See demo (assignment)</a:t>
+            </a:r>
+            <a:endParaRPr lang="en-US" dirty="0"/>
           </a:p>
         </p:txBody>
       </p:sp>
     </p:spTree>
     <p:extLst>
       <p:ext uri="{BB962C8B-B14F-4D97-AF65-F5344CB8AC3E}">
-        <p14:creationId xmlns:p14="http://schemas.microsoft.com/office/powerpoint/2010/main" val="3427927982"/>
+        <p14:creationId xmlns:p14="http://schemas.microsoft.com/office/powerpoint/2010/main" val="2760734518"/>
       </p:ext>
     </p:extLst>
   </p:cSld>
@@ -7645,28 +7947,24 @@
           <a:lstStyle/>
           <a:p>
             <a:r>
-              <a:rPr lang="en-US" altLang="zh-CN" dirty="0" smtClean="0"/>
-              <a:t>R</a:t>
-            </a:r>
-            <a:r>
-              <a:rPr lang="en-US" dirty="0" smtClean="0"/>
-              <a:t>ule of </a:t>
-            </a:r>
-            <a:r>
-              <a:rPr lang="en-US" altLang="zh-CN" dirty="0" smtClean="0"/>
-              <a:t>T</a:t>
-            </a:r>
-            <a:r>
-              <a:rPr lang="en-US" dirty="0" smtClean="0"/>
-              <a:t>hree (</a:t>
-            </a:r>
-            <a:r>
-              <a:rPr lang="en-US" dirty="0" smtClean="0"/>
-              <a:t>Prior to C++11</a:t>
-            </a:r>
-            <a:r>
-              <a:rPr lang="en-US" dirty="0" smtClean="0"/>
-              <a:t>)</a:t>
+              <a:rPr lang="en-US" dirty="0" smtClean="0"/>
+              <a:t>Handle Self </a:t>
+            </a:r>
+            <a:r>
+              <a:rPr lang="en-US" dirty="0"/>
+              <a:t>A</a:t>
+            </a:r>
+            <a:r>
+              <a:rPr lang="en-US" dirty="0" smtClean="0"/>
+              <a:t>ssignment in Assignment </a:t>
+            </a:r>
+            <a:r>
+              <a:rPr lang="en-US" dirty="0"/>
+              <a:t>O</a:t>
+            </a:r>
+            <a:r>
+              <a:rPr lang="en-US" dirty="0" smtClean="0"/>
+              <a:t>perator</a:t>
             </a:r>
             <a:endParaRPr lang="en-US" dirty="0"/>
           </a:p>
@@ -7685,72 +7983,149 @@
         <p:spPr/>
         <p:txBody>
           <a:bodyPr>
-            <a:normAutofit/>
+            <a:normAutofit lnSpcReduction="10000"/>
           </a:bodyPr>
           <a:lstStyle/>
           <a:p>
             <a:r>
               <a:rPr lang="en-US" dirty="0" smtClean="0"/>
-              <a:t>also known as the Law of The Big Three or The Big Three</a:t>
-            </a:r>
-          </a:p>
-          <a:p>
-            <a:r>
-              <a:rPr lang="en-US" dirty="0" smtClean="0"/>
-              <a:t>if a class defines one (or more) of the following it should probably explicitly define all three:</a:t>
-            </a:r>
-          </a:p>
-          <a:p>
-            <a:pPr lvl="1"/>
-            <a:r>
-              <a:rPr lang="en-US" dirty="0" smtClean="0"/>
-              <a:t>destructor</a:t>
-            </a:r>
-          </a:p>
-          <a:p>
-            <a:pPr lvl="1"/>
-            <a:r>
-              <a:rPr lang="en-US" dirty="0" smtClean="0"/>
-              <a:t>copy constructor</a:t>
-            </a:r>
-          </a:p>
-          <a:p>
-            <a:pPr lvl="1"/>
-            <a:r>
-              <a:rPr lang="en-US" dirty="0" smtClean="0"/>
-              <a:t>copy assignment operator</a:t>
-            </a:r>
-          </a:p>
-          <a:p>
-            <a:r>
-              <a:rPr lang="en-US" dirty="0"/>
-              <a:t>R</a:t>
-            </a:r>
-            <a:r>
-              <a:rPr lang="en-US" dirty="0" smtClean="0"/>
-              <a:t>ule of Five </a:t>
-            </a:r>
-            <a:r>
-              <a:rPr lang="en-US" dirty="0"/>
-              <a:t>(</a:t>
-            </a:r>
-            <a:r>
-              <a:rPr lang="en-US" dirty="0" smtClean="0"/>
-              <a:t>C++ 11):</a:t>
-            </a:r>
-          </a:p>
-          <a:p>
-            <a:pPr lvl="1"/>
-            <a:r>
-              <a:rPr lang="en-US" dirty="0" smtClean="0"/>
-              <a:t>copy assignment operator</a:t>
-            </a:r>
-          </a:p>
-          <a:p>
-            <a:pPr lvl="1"/>
-            <a:r>
-              <a:rPr lang="en-US" dirty="0" smtClean="0"/>
-              <a:t>move assignment operator</a:t>
+              <a:t>With identity test?</a:t>
+            </a:r>
+          </a:p>
+          <a:p>
+            <a:pPr marL="0" indent="0">
+              <a:buNone/>
+            </a:pPr>
+            <a:r>
+              <a:rPr lang="en-US" dirty="0" smtClean="0"/>
+              <a:t>Operation&amp; operator=(</a:t>
+            </a:r>
+            <a:r>
+              <a:rPr lang="en-US" dirty="0" err="1" smtClean="0"/>
+              <a:t>const</a:t>
+            </a:r>
+            <a:r>
+              <a:rPr lang="en-US" dirty="0" smtClean="0"/>
+              <a:t> Operation&amp; </a:t>
+            </a:r>
+            <a:r>
+              <a:rPr lang="en-US" dirty="0" err="1" smtClean="0"/>
+              <a:t>rhs</a:t>
+            </a:r>
+            <a:r>
+              <a:rPr lang="en-US" dirty="0" smtClean="0"/>
+              <a:t>) {</a:t>
+            </a:r>
+          </a:p>
+          <a:p>
+            <a:pPr marL="0" indent="0">
+              <a:buNone/>
+            </a:pPr>
+            <a:r>
+              <a:rPr lang="en-US" dirty="0" smtClean="0"/>
+              <a:t>       </a:t>
+            </a:r>
+            <a:r>
+              <a:rPr lang="en-US" dirty="0" smtClean="0">
+                <a:solidFill>
+                  <a:srgbClr val="FF0000"/>
+                </a:solidFill>
+              </a:rPr>
+              <a:t> if (this == &amp;</a:t>
+            </a:r>
+            <a:r>
+              <a:rPr lang="en-US" dirty="0" err="1" smtClean="0">
+                <a:solidFill>
+                  <a:srgbClr val="FF0000"/>
+                </a:solidFill>
+              </a:rPr>
+              <a:t>rhs</a:t>
+            </a:r>
+            <a:r>
+              <a:rPr lang="en-US" dirty="0" smtClean="0">
+                <a:solidFill>
+                  <a:srgbClr val="FF0000"/>
+                </a:solidFill>
+              </a:rPr>
+              <a:t>)  return *this;</a:t>
+            </a:r>
+          </a:p>
+          <a:p>
+            <a:pPr marL="0" indent="0">
+              <a:buNone/>
+            </a:pPr>
+            <a:r>
+              <a:rPr lang="en-US" dirty="0" smtClean="0"/>
+              <a:t>        delete </a:t>
+            </a:r>
+            <a:r>
+              <a:rPr lang="en-US" dirty="0" err="1" smtClean="0"/>
+              <a:t>pSecret</a:t>
+            </a:r>
+            <a:r>
+              <a:rPr lang="en-US" dirty="0" smtClean="0"/>
+              <a:t>;</a:t>
+            </a:r>
+          </a:p>
+          <a:p>
+            <a:pPr marL="0" indent="0">
+              <a:buNone/>
+            </a:pPr>
+            <a:r>
+              <a:rPr lang="en-US" dirty="0" smtClean="0"/>
+              <a:t>        </a:t>
+            </a:r>
+            <a:r>
+              <a:rPr lang="en-US" dirty="0" err="1" smtClean="0"/>
+              <a:t>pSecret</a:t>
+            </a:r>
+            <a:r>
+              <a:rPr lang="en-US" dirty="0" smtClean="0"/>
+              <a:t> = new string(*</a:t>
+            </a:r>
+            <a:r>
+              <a:rPr lang="en-US" dirty="0" err="1" smtClean="0"/>
+              <a:t>rhs.pSecret</a:t>
+            </a:r>
+            <a:r>
+              <a:rPr lang="en-US" dirty="0" smtClean="0"/>
+              <a:t>);</a:t>
+            </a:r>
+          </a:p>
+          <a:p>
+            <a:pPr marL="0" indent="0">
+              <a:buNone/>
+            </a:pPr>
+            <a:r>
+              <a:rPr lang="en-US" dirty="0" smtClean="0"/>
+              <a:t>        return *this;</a:t>
+            </a:r>
+          </a:p>
+          <a:p>
+            <a:pPr marL="0" indent="0">
+              <a:buNone/>
+            </a:pPr>
+            <a:r>
+              <a:rPr lang="en-US" dirty="0" smtClean="0"/>
+              <a:t>    }</a:t>
+            </a:r>
+          </a:p>
+          <a:p>
+            <a:pPr marL="0" indent="0">
+              <a:buNone/>
+            </a:pPr>
+            <a:r>
+              <a:rPr lang="en-US" dirty="0" smtClean="0"/>
+              <a:t>Yes, it works. But… </a:t>
+            </a:r>
+          </a:p>
+          <a:p>
+            <a:pPr marL="0" indent="0">
+              <a:buNone/>
+            </a:pPr>
+            <a:r>
+              <a:rPr lang="en-US" dirty="0" smtClean="0"/>
+              <a:t>what about exception safety?</a:t>
             </a:r>
             <a:endParaRPr lang="en-US" dirty="0"/>
           </a:p>
@@ -7759,7 +8134,7 @@
     </p:spTree>
     <p:extLst>
       <p:ext uri="{BB962C8B-B14F-4D97-AF65-F5344CB8AC3E}">
-        <p14:creationId xmlns:p14="http://schemas.microsoft.com/office/powerpoint/2010/main" val="715365882"/>
+        <p14:creationId xmlns:p14="http://schemas.microsoft.com/office/powerpoint/2010/main" val="4175913250"/>
       </p:ext>
     </p:extLst>
   </p:cSld>
@@ -7809,10 +8184,10 @@
           <a:lstStyle/>
           <a:p>
             <a:r>
-              <a:rPr lang="sv-SE" dirty="0" smtClean="0"/>
-              <a:t>Explicitly disallow the use of compiler-generated functions you do not want.</a:t>
-            </a:r>
-            <a:endParaRPr lang="sv-SE" dirty="0" smtClean="0"/>
+              <a:rPr lang="en-US" dirty="0" smtClean="0"/>
+              <a:t>Exception Safety</a:t>
+            </a:r>
+            <a:endParaRPr lang="en-US" dirty="0"/>
           </a:p>
         </p:txBody>
       </p:sp>
@@ -7829,30 +8204,100 @@
         <p:spPr/>
         <p:txBody>
           <a:bodyPr>
-            <a:normAutofit/>
+            <a:normAutofit fontScale="85000" lnSpcReduction="20000"/>
           </a:bodyPr>
           <a:lstStyle/>
           <a:p>
-            <a:pPr marL="0" indent="0">
-              <a:buNone/>
-            </a:pPr>
-            <a:r>
-              <a:rPr lang="sv-SE" dirty="0" smtClean="0"/>
-              <a:t>Example: Do not want an object to be copied</a:t>
-            </a:r>
-          </a:p>
-          <a:p>
-            <a:pPr marL="0" indent="0">
-              <a:buNone/>
-            </a:pPr>
-            <a:endParaRPr lang="sv-SE" dirty="0" smtClean="0"/>
+            <a:r>
+              <a:rPr lang="en-US" dirty="0" smtClean="0">
+                <a:solidFill>
+                  <a:srgbClr val="0070C0"/>
+                </a:solidFill>
+              </a:rPr>
+              <a:t>No-throw guarantee: </a:t>
+            </a:r>
+            <a:br>
+              <a:rPr lang="en-US" dirty="0" smtClean="0">
+                <a:solidFill>
+                  <a:srgbClr val="0070C0"/>
+                </a:solidFill>
+              </a:rPr>
+            </a:br>
+            <a:r>
+              <a:rPr lang="en-US" dirty="0" smtClean="0"/>
+              <a:t>Operations are guaranteed to succeed and satisfy all requirements even in exceptional situations. If an exception occurs, it will be handled internally and not observed by clients.</a:t>
+            </a:r>
+          </a:p>
+          <a:p>
+            <a:r>
+              <a:rPr lang="en-US" dirty="0" smtClean="0">
+                <a:solidFill>
+                  <a:srgbClr val="0070C0"/>
+                </a:solidFill>
+              </a:rPr>
+              <a:t>Strong exception safety: </a:t>
+            </a:r>
+            <a:br>
+              <a:rPr lang="en-US" dirty="0" smtClean="0">
+                <a:solidFill>
+                  <a:srgbClr val="0070C0"/>
+                </a:solidFill>
+              </a:rPr>
+            </a:br>
+            <a:r>
+              <a:rPr lang="en-US" dirty="0" smtClean="0"/>
+              <a:t>Operations can fail, but failed operations are guaranteed to have no side effects, so all data retain their original values.</a:t>
+            </a:r>
+          </a:p>
+          <a:p>
+            <a:r>
+              <a:rPr lang="en-US" dirty="0" smtClean="0">
+                <a:solidFill>
+                  <a:srgbClr val="0070C0"/>
+                </a:solidFill>
+              </a:rPr>
+              <a:t>Basic exception safety:</a:t>
+            </a:r>
+            <a:r>
+              <a:rPr lang="en-US" dirty="0" smtClean="0"/>
+              <a:t> </a:t>
+            </a:r>
+            <a:br>
+              <a:rPr lang="en-US" dirty="0" smtClean="0"/>
+            </a:br>
+            <a:r>
+              <a:rPr lang="en-US" dirty="0" smtClean="0"/>
+              <a:t>Partial execution of failed operations can cause side effects, but all invariants are preserved and there are no resource leaks (including memory leaks). Any stored data will contain valid values, even if they differ from what they were before the exception.</a:t>
+            </a:r>
+          </a:p>
+          <a:p>
+            <a:r>
+              <a:rPr lang="en-US" dirty="0" smtClean="0">
+                <a:solidFill>
+                  <a:srgbClr val="0070C0"/>
+                </a:solidFill>
+              </a:rPr>
+              <a:t>No exception safety: </a:t>
+            </a:r>
+            <a:r>
+              <a:rPr lang="en-US" dirty="0" smtClean="0"/>
+              <a:t/>
+            </a:r>
+            <a:br>
+              <a:rPr lang="en-US" dirty="0" smtClean="0"/>
+            </a:br>
+            <a:r>
+              <a:rPr lang="en-US" dirty="0" smtClean="0"/>
+              <a:t>No guarantees are made.</a:t>
+            </a:r>
+            <a:endParaRPr lang="en-US" dirty="0"/>
           </a:p>
         </p:txBody>
       </p:sp>
     </p:spTree>
     <p:extLst>
       <p:ext uri="{BB962C8B-B14F-4D97-AF65-F5344CB8AC3E}">
-        <p14:creationId xmlns:p14="http://schemas.microsoft.com/office/powerpoint/2010/main" val="3058684884"/>
+        <p14:creationId xmlns:p14="http://schemas.microsoft.com/office/powerpoint/2010/main" val="1872696242"/>
       </p:ext>
     </p:extLst>
   </p:cSld>
@@ -7902,8 +8347,16 @@
           <a:lstStyle/>
           <a:p>
             <a:r>
-              <a:rPr lang="sv-SE" dirty="0" smtClean="0"/>
-              <a:t>Solution 1</a:t>
+              <a:rPr lang="en-US" dirty="0" smtClean="0"/>
+              <a:t>Strong Exception </a:t>
+            </a:r>
+            <a:r>
+              <a:rPr lang="en-US" dirty="0"/>
+              <a:t>S</a:t>
+            </a:r>
+            <a:r>
+              <a:rPr lang="en-US" dirty="0" smtClean="0"/>
+              <a:t>afety Version</a:t>
             </a:r>
             <a:endParaRPr lang="en-US" dirty="0"/>
           </a:p>
@@ -7922,7 +8375,7 @@
         <p:spPr/>
         <p:txBody>
           <a:bodyPr>
-            <a:normAutofit fontScale="92500" lnSpcReduction="20000"/>
+            <a:normAutofit fontScale="92500" lnSpcReduction="10000"/>
           </a:bodyPr>
           <a:lstStyle/>
           <a:p>
@@ -7930,75 +8383,159 @@
               <a:buNone/>
             </a:pPr>
             <a:r>
-              <a:rPr lang="sv-SE" dirty="0" smtClean="0"/>
-              <a:t>Declare copy constructor and assignment operator to be private (and do not define them)</a:t>
-            </a:r>
-          </a:p>
-          <a:p>
-            <a:pPr marL="0" indent="0">
-              <a:buNone/>
-            </a:pPr>
-            <a:r>
-              <a:rPr lang="sv-SE" dirty="0" smtClean="0"/>
-              <a:t>class Uncopyable {</a:t>
-            </a:r>
-          </a:p>
-          <a:p>
-            <a:pPr marL="0" indent="0">
-              <a:buNone/>
-            </a:pPr>
-            <a:r>
-              <a:rPr lang="sv-SE" dirty="0" smtClean="0"/>
-              <a:t>private:</a:t>
-            </a:r>
-          </a:p>
-          <a:p>
-            <a:pPr marL="0" indent="0">
-              <a:buNone/>
-            </a:pPr>
-            <a:r>
-              <a:rPr lang="sv-SE" dirty="0" smtClean="0"/>
-              <a:t>  Uncopyable(const Uncopyable&amp;);</a:t>
-            </a:r>
-          </a:p>
-          <a:p>
-            <a:pPr marL="0" indent="0">
-              <a:buNone/>
-            </a:pPr>
-            <a:r>
-              <a:rPr lang="sv-SE" dirty="0" smtClean="0"/>
-              <a:t>  Uncopyable&amp; operator=(const Uncopyable&amp;);</a:t>
-            </a:r>
-          </a:p>
-          <a:p>
-            <a:pPr marL="0" indent="0">
-              <a:buNone/>
-            </a:pPr>
-            <a:r>
-              <a:rPr lang="sv-SE" dirty="0" smtClean="0"/>
-              <a:t>} </a:t>
-            </a:r>
-          </a:p>
-          <a:p>
-            <a:pPr marL="0" indent="0">
-              <a:buNone/>
-            </a:pPr>
-            <a:r>
-              <a:rPr lang="sv-SE" dirty="0" smtClean="0"/>
-              <a:t>Note: </a:t>
-            </a:r>
-          </a:p>
-          <a:p>
-            <a:pPr marL="0" indent="0">
-              <a:buNone/>
-            </a:pPr>
-            <a:r>
-              <a:rPr lang="sv-SE" dirty="0" smtClean="0"/>
-              <a:t>MTAS/TSP, needs to implement all functions/methods because the compiler could not detect error for calling a declared but not defined class method during compilation time, but indeed result in CA during runtime.</a:t>
-            </a:r>
-            <a:endParaRPr lang="sv-SE" dirty="0" smtClean="0"/>
-          </a:p>
-          <a:p>
+              <a:rPr lang="en-US" dirty="0" smtClean="0"/>
+              <a:t>Operation&amp; operator=(</a:t>
+            </a:r>
+            <a:r>
+              <a:rPr lang="en-US" dirty="0" err="1" smtClean="0"/>
+              <a:t>const</a:t>
+            </a:r>
+            <a:r>
+              <a:rPr lang="en-US" dirty="0" smtClean="0"/>
+              <a:t> Operation&amp; </a:t>
+            </a:r>
+            <a:r>
+              <a:rPr lang="en-US" dirty="0" err="1" smtClean="0"/>
+              <a:t>rhs</a:t>
+            </a:r>
+            <a:r>
+              <a:rPr lang="en-US" dirty="0" smtClean="0"/>
+              <a:t>) {</a:t>
+            </a:r>
+          </a:p>
+          <a:p>
+            <a:pPr marL="0" indent="0">
+              <a:buNone/>
+            </a:pPr>
+            <a:r>
+              <a:rPr lang="en-US" dirty="0" smtClean="0"/>
+              <a:t>        </a:t>
+            </a:r>
+            <a:r>
+              <a:rPr lang="en-US" dirty="0" smtClean="0">
+                <a:solidFill>
+                  <a:srgbClr val="FF0000"/>
+                </a:solidFill>
+              </a:rPr>
+              <a:t>string* </a:t>
+            </a:r>
+            <a:r>
+              <a:rPr lang="en-US" dirty="0" err="1" smtClean="0">
+                <a:solidFill>
+                  <a:srgbClr val="FF0000"/>
+                </a:solidFill>
+              </a:rPr>
+              <a:t>pStr</a:t>
+            </a:r>
+            <a:r>
+              <a:rPr lang="en-US" dirty="0" smtClean="0">
+                <a:solidFill>
+                  <a:srgbClr val="FF0000"/>
+                </a:solidFill>
+              </a:rPr>
+              <a:t> = </a:t>
+            </a:r>
+            <a:r>
+              <a:rPr lang="en-US" dirty="0" err="1" smtClean="0">
+                <a:solidFill>
+                  <a:srgbClr val="FF0000"/>
+                </a:solidFill>
+              </a:rPr>
+              <a:t>pSecret</a:t>
+            </a:r>
+            <a:r>
+              <a:rPr lang="en-US" dirty="0" smtClean="0">
+                <a:solidFill>
+                  <a:srgbClr val="FF0000"/>
+                </a:solidFill>
+              </a:rPr>
+              <a:t>;</a:t>
+            </a:r>
+          </a:p>
+          <a:p>
+            <a:pPr marL="0" indent="0">
+              <a:buNone/>
+            </a:pPr>
+            <a:r>
+              <a:rPr lang="en-US" dirty="0" smtClean="0"/>
+              <a:t>        </a:t>
+            </a:r>
+            <a:r>
+              <a:rPr lang="en-US" dirty="0" err="1" smtClean="0"/>
+              <a:t>pSecret</a:t>
+            </a:r>
+            <a:r>
+              <a:rPr lang="en-US" dirty="0" smtClean="0"/>
+              <a:t> = new string(*</a:t>
+            </a:r>
+            <a:r>
+              <a:rPr lang="en-US" dirty="0" err="1" smtClean="0"/>
+              <a:t>rhs.pSecret</a:t>
+            </a:r>
+            <a:r>
+              <a:rPr lang="en-US" dirty="0" smtClean="0"/>
+              <a:t>);</a:t>
+            </a:r>
+          </a:p>
+          <a:p>
+            <a:pPr marL="0" indent="0">
+              <a:buNone/>
+            </a:pPr>
+            <a:r>
+              <a:rPr lang="en-US" dirty="0" smtClean="0"/>
+              <a:t>        delete </a:t>
+            </a:r>
+            <a:r>
+              <a:rPr lang="en-US" dirty="0" err="1" smtClean="0"/>
+              <a:t>pStr</a:t>
+            </a:r>
+            <a:r>
+              <a:rPr lang="en-US" dirty="0" smtClean="0"/>
+              <a:t>;</a:t>
+            </a:r>
+          </a:p>
+          <a:p>
+            <a:pPr marL="0" indent="0">
+              <a:buNone/>
+            </a:pPr>
+            <a:r>
+              <a:rPr lang="en-US" dirty="0" smtClean="0"/>
+              <a:t>        return *this;</a:t>
+            </a:r>
+          </a:p>
+          <a:p>
+            <a:pPr marL="0" indent="0">
+              <a:buNone/>
+            </a:pPr>
+            <a:r>
+              <a:rPr lang="en-US" dirty="0" smtClean="0"/>
+              <a:t>    }</a:t>
+            </a:r>
+          </a:p>
+          <a:p>
+            <a:pPr marL="0" indent="0">
+              <a:buNone/>
+            </a:pPr>
+            <a:endParaRPr lang="en-US" dirty="0" smtClean="0"/>
+          </a:p>
+          <a:p>
+            <a:r>
+              <a:rPr lang="en-US" dirty="0" smtClean="0"/>
+              <a:t>It achieves strong exception safety, and could handle self-assignment.</a:t>
+            </a:r>
+          </a:p>
+          <a:p>
+            <a:r>
+              <a:rPr lang="en-US" dirty="0" smtClean="0"/>
+              <a:t>Hmm… it requires us to manually arrange the order of each line of codes.</a:t>
+            </a:r>
+            <a:br>
+              <a:rPr lang="en-US" dirty="0" smtClean="0"/>
+            </a:br>
+            <a:r>
+              <a:rPr lang="en-US" dirty="0" smtClean="0"/>
+              <a:t>Any easier way?</a:t>
+            </a:r>
             <a:endParaRPr lang="en-US" dirty="0"/>
           </a:p>
         </p:txBody>
@@ -8006,7 +8543,7 @@
     </p:spTree>
     <p:extLst>
       <p:ext uri="{BB962C8B-B14F-4D97-AF65-F5344CB8AC3E}">
-        <p14:creationId xmlns:p14="http://schemas.microsoft.com/office/powerpoint/2010/main" val="1662578072"/>
+        <p14:creationId xmlns:p14="http://schemas.microsoft.com/office/powerpoint/2010/main" val="3292551799"/>
       </p:ext>
     </p:extLst>
   </p:cSld>
@@ -8056,8 +8593,8 @@
           <a:lstStyle/>
           <a:p>
             <a:r>
-              <a:rPr lang="sv-SE" dirty="0" smtClean="0"/>
-              <a:t>Solution 2</a:t>
+              <a:rPr lang="en-US" dirty="0" smtClean="0"/>
+              <a:t>Copy-Swap idiom</a:t>
             </a:r>
             <a:endParaRPr lang="en-US" dirty="0"/>
           </a:p>
@@ -8075,34 +8612,493 @@
         </p:nvSpPr>
         <p:spPr/>
         <p:txBody>
-          <a:bodyPr/>
-          <a:lstStyle/>
-          <a:p>
-            <a:r>
-              <a:rPr lang="sv-SE" dirty="0" smtClean="0"/>
-              <a:t>Inherit from an Uncopyable class</a:t>
-            </a:r>
-            <a:br>
-              <a:rPr lang="sv-SE" dirty="0" smtClean="0"/>
-            </a:br>
-            <a:r>
-              <a:rPr lang="sv-SE" dirty="0" smtClean="0"/>
-              <a:t>class A : public Uncopyable {...}</a:t>
-            </a:r>
-            <a:endParaRPr lang="sv-SE" dirty="0"/>
-          </a:p>
-          <a:p>
-            <a:pPr marL="0" indent="0">
-              <a:buNone/>
-            </a:pPr>
-            <a:endParaRPr lang="en-US" dirty="0" smtClean="0"/>
+          <a:bodyPr>
+            <a:normAutofit lnSpcReduction="10000"/>
+          </a:bodyPr>
+          <a:lstStyle/>
+          <a:p>
+            <a:pPr marL="0" indent="0">
+              <a:buNone/>
+            </a:pPr>
+            <a:r>
+              <a:rPr lang="en-US" dirty="0" smtClean="0"/>
+              <a:t>    Operation&amp; operator=(Operation </a:t>
+            </a:r>
+            <a:r>
+              <a:rPr lang="en-US" dirty="0" err="1" smtClean="0"/>
+              <a:t>rhs</a:t>
+            </a:r>
+            <a:r>
+              <a:rPr lang="en-US" dirty="0" smtClean="0"/>
+              <a:t>) {</a:t>
+            </a:r>
+          </a:p>
+          <a:p>
+            <a:pPr marL="0" indent="0">
+              <a:buNone/>
+            </a:pPr>
+            <a:r>
+              <a:rPr lang="en-US" dirty="0" smtClean="0"/>
+              <a:t>        swap(*this, </a:t>
+            </a:r>
+            <a:r>
+              <a:rPr lang="en-US" dirty="0" err="1" smtClean="0"/>
+              <a:t>rhs</a:t>
+            </a:r>
+            <a:r>
+              <a:rPr lang="en-US" dirty="0" smtClean="0"/>
+              <a:t>);</a:t>
+            </a:r>
+          </a:p>
+          <a:p>
+            <a:pPr marL="0" indent="0">
+              <a:buNone/>
+            </a:pPr>
+            <a:r>
+              <a:rPr lang="en-US" dirty="0" smtClean="0"/>
+              <a:t>        return *this;</a:t>
+            </a:r>
+          </a:p>
+          <a:p>
+            <a:pPr marL="0" indent="0">
+              <a:buNone/>
+            </a:pPr>
+            <a:r>
+              <a:rPr lang="en-US" dirty="0" smtClean="0"/>
+              <a:t>    }</a:t>
+            </a:r>
+          </a:p>
+          <a:p>
+            <a:pPr marL="0" indent="0">
+              <a:buNone/>
+            </a:pPr>
+            <a:endParaRPr lang="en-US" dirty="0"/>
+          </a:p>
+          <a:p>
+            <a:pPr marL="0" indent="0">
+              <a:buNone/>
+            </a:pPr>
+            <a:r>
+              <a:rPr lang="en-US" dirty="0" smtClean="0"/>
+              <a:t>    </a:t>
+            </a:r>
+            <a:r>
+              <a:rPr lang="en-US" dirty="0" smtClean="0">
+                <a:solidFill>
+                  <a:srgbClr val="FF0000"/>
+                </a:solidFill>
+              </a:rPr>
+              <a:t>friend</a:t>
+            </a:r>
+            <a:r>
+              <a:rPr lang="en-US" dirty="0" smtClean="0"/>
+              <a:t> void swap(Operation&amp; lhs, Operation&amp; </a:t>
+            </a:r>
+            <a:r>
+              <a:rPr lang="en-US" dirty="0" err="1" smtClean="0"/>
+              <a:t>rhs</a:t>
+            </a:r>
+            <a:r>
+              <a:rPr lang="en-US" dirty="0" smtClean="0"/>
+              <a:t>)</a:t>
+            </a:r>
+          </a:p>
+          <a:p>
+            <a:pPr marL="0" indent="0">
+              <a:buNone/>
+            </a:pPr>
+            <a:r>
+              <a:rPr lang="en-US" dirty="0" smtClean="0"/>
+              <a:t>    {</a:t>
+            </a:r>
+          </a:p>
+          <a:p>
+            <a:pPr marL="0" indent="0">
+              <a:buNone/>
+            </a:pPr>
+            <a:r>
+              <a:rPr lang="en-US" smtClean="0"/>
+              <a:t>        swap(</a:t>
+            </a:r>
+            <a:r>
+              <a:rPr lang="en-US" dirty="0" err="1" smtClean="0"/>
+              <a:t>lhs.pSecret</a:t>
+            </a:r>
+            <a:r>
+              <a:rPr lang="en-US" dirty="0" smtClean="0"/>
+              <a:t>, </a:t>
+            </a:r>
+            <a:r>
+              <a:rPr lang="en-US" dirty="0" err="1" smtClean="0"/>
+              <a:t>rhs.pSecret</a:t>
+            </a:r>
+            <a:r>
+              <a:rPr lang="en-US" dirty="0" smtClean="0"/>
+              <a:t>);</a:t>
+            </a:r>
+          </a:p>
+          <a:p>
+            <a:pPr marL="0" indent="0">
+              <a:buNone/>
+            </a:pPr>
+            <a:r>
+              <a:rPr lang="en-US" dirty="0" smtClean="0"/>
+              <a:t>    }</a:t>
+            </a:r>
+          </a:p>
+          <a:p>
+            <a:pPr marL="0" indent="0">
+              <a:buNone/>
+            </a:pPr>
+            <a:endParaRPr lang="en-US" dirty="0"/>
           </a:p>
         </p:txBody>
       </p:sp>
     </p:spTree>
     <p:extLst>
       <p:ext uri="{BB962C8B-B14F-4D97-AF65-F5344CB8AC3E}">
-        <p14:creationId xmlns:p14="http://schemas.microsoft.com/office/powerpoint/2010/main" val="1369380194"/>
+        <p14:creationId xmlns:p14="http://schemas.microsoft.com/office/powerpoint/2010/main" val="680184045"/>
+      </p:ext>
+    </p:extLst>
+  </p:cSld>
+  <p:clrMapOvr>
+    <a:masterClrMapping/>
+  </p:clrMapOvr>
+  <p:timing>
+    <p:tnLst>
+      <p:par>
+        <p:cTn id="1" dur="indefinite" restart="never" nodeType="tmRoot"/>
+      </p:par>
+    </p:tnLst>
+  </p:timing>
+</p:sld>
+</file>
+
+<file path=ppt/slides/slide37.xml><?xml version="1.0" encoding="utf-8"?>
+<p:sld xmlns:a="http://schemas.openxmlformats.org/drawingml/2006/main" xmlns:r="http://schemas.openxmlformats.org/officeDocument/2006/relationships" xmlns:p="http://schemas.openxmlformats.org/presentationml/2006/main">
+  <p:cSld>
+    <p:spTree>
+      <p:nvGrpSpPr>
+        <p:cNvPr id="1" name=""/>
+        <p:cNvGrpSpPr/>
+        <p:nvPr/>
+      </p:nvGrpSpPr>
+      <p:grpSpPr>
+        <a:xfrm>
+          <a:off x="0" y="0"/>
+          <a:ext cx="0" cy="0"/>
+          <a:chOff x="0" y="0"/>
+          <a:chExt cx="0" cy="0"/>
+        </a:xfrm>
+      </p:grpSpPr>
+      <p:sp>
+        <p:nvSpPr>
+          <p:cNvPr id="2" name="Title 1"/>
+          <p:cNvSpPr>
+            <a:spLocks noGrp="1"/>
+          </p:cNvSpPr>
+          <p:nvPr>
+            <p:ph type="title"/>
+          </p:nvPr>
+        </p:nvSpPr>
+        <p:spPr/>
+        <p:txBody>
+          <a:bodyPr/>
+          <a:lstStyle/>
+          <a:p>
+            <a:r>
+              <a:rPr lang="en-US" dirty="0" smtClean="0"/>
+              <a:t>Why friend function?</a:t>
+            </a:r>
+            <a:endParaRPr lang="en-US" dirty="0"/>
+          </a:p>
+        </p:txBody>
+      </p:sp>
+      <p:sp>
+        <p:nvSpPr>
+          <p:cNvPr id="3" name="Content Placeholder 2"/>
+          <p:cNvSpPr>
+            <a:spLocks noGrp="1"/>
+          </p:cNvSpPr>
+          <p:nvPr>
+            <p:ph idx="1"/>
+          </p:nvPr>
+        </p:nvSpPr>
+        <p:spPr/>
+        <p:txBody>
+          <a:bodyPr/>
+          <a:lstStyle/>
+          <a:p>
+            <a:r>
+              <a:rPr lang="en-US" dirty="0" smtClean="0"/>
+              <a:t>A friend function defined inside a class isn't a member function - it exists in the enclosing namespace scope. In general, such a function won't be seen in that scope by external code, but since it takes an argument of type Operation, it'll be found by Argument-Dependent Lookup.</a:t>
+            </a:r>
+          </a:p>
+          <a:p>
+            <a:pPr marL="457200" lvl="1" indent="0">
+              <a:buNone/>
+            </a:pPr>
+            <a:r>
+              <a:rPr lang="en-US" dirty="0" smtClean="0"/>
+              <a:t>So… you can use swap in operator assignment for Operator class</a:t>
+            </a:r>
+          </a:p>
+          <a:p>
+            <a:pPr marL="457200" lvl="1" indent="0">
+              <a:buNone/>
+            </a:pPr>
+            <a:r>
+              <a:rPr lang="en-US" dirty="0" smtClean="0"/>
+              <a:t>And…</a:t>
+            </a:r>
+          </a:p>
+          <a:p>
+            <a:pPr marL="457200" lvl="1" indent="0">
+              <a:buNone/>
+            </a:pPr>
+            <a:r>
+              <a:rPr lang="en-US" dirty="0" smtClean="0"/>
+              <a:t>Operation a(“a”), b(“b”);</a:t>
+            </a:r>
+          </a:p>
+          <a:p>
+            <a:pPr marL="457200" lvl="1" indent="0">
+              <a:buNone/>
+            </a:pPr>
+            <a:r>
+              <a:rPr lang="en-US" dirty="0"/>
+              <a:t>s</a:t>
+            </a:r>
+            <a:r>
+              <a:rPr lang="en-US" dirty="0" smtClean="0"/>
+              <a:t>wap(a, b);</a:t>
+            </a:r>
+            <a:endParaRPr lang="en-US" dirty="0"/>
+          </a:p>
+        </p:txBody>
+      </p:sp>
+    </p:spTree>
+    <p:extLst>
+      <p:ext uri="{BB962C8B-B14F-4D97-AF65-F5344CB8AC3E}">
+        <p14:creationId xmlns:p14="http://schemas.microsoft.com/office/powerpoint/2010/main" val="1497298972"/>
+      </p:ext>
+    </p:extLst>
+  </p:cSld>
+  <p:clrMapOvr>
+    <a:masterClrMapping/>
+  </p:clrMapOvr>
+  <p:timing>
+    <p:tnLst>
+      <p:par>
+        <p:cTn id="1" dur="indefinite" restart="never" nodeType="tmRoot"/>
+      </p:par>
+    </p:tnLst>
+  </p:timing>
+</p:sld>
+</file>
+
+<file path=ppt/slides/slide38.xml><?xml version="1.0" encoding="utf-8"?>
+<p:sld xmlns:a="http://schemas.openxmlformats.org/drawingml/2006/main" xmlns:r="http://schemas.openxmlformats.org/officeDocument/2006/relationships" xmlns:p="http://schemas.openxmlformats.org/presentationml/2006/main">
+  <p:cSld>
+    <p:spTree>
+      <p:nvGrpSpPr>
+        <p:cNvPr id="1" name=""/>
+        <p:cNvGrpSpPr/>
+        <p:nvPr/>
+      </p:nvGrpSpPr>
+      <p:grpSpPr>
+        <a:xfrm>
+          <a:off x="0" y="0"/>
+          <a:ext cx="0" cy="0"/>
+          <a:chOff x="0" y="0"/>
+          <a:chExt cx="0" cy="0"/>
+        </a:xfrm>
+      </p:grpSpPr>
+      <p:sp>
+        <p:nvSpPr>
+          <p:cNvPr id="2" name="Title 1"/>
+          <p:cNvSpPr>
+            <a:spLocks noGrp="1"/>
+          </p:cNvSpPr>
+          <p:nvPr>
+            <p:ph type="title"/>
+          </p:nvPr>
+        </p:nvSpPr>
+        <p:spPr/>
+        <p:txBody>
+          <a:bodyPr/>
+          <a:lstStyle/>
+          <a:p>
+            <a:r>
+              <a:rPr lang="en-US" dirty="0" smtClean="0"/>
+              <a:t>Copy-Swap idiom for </a:t>
+            </a:r>
+            <a:br>
+              <a:rPr lang="en-US" dirty="0" smtClean="0"/>
+            </a:br>
+            <a:r>
+              <a:rPr lang="en-US" dirty="0" smtClean="0"/>
+              <a:t>M</a:t>
+            </a:r>
+            <a:r>
+              <a:rPr lang="en-US" dirty="0" smtClean="0"/>
+              <a:t>ove </a:t>
+            </a:r>
+            <a:r>
+              <a:rPr lang="en-US" dirty="0"/>
+              <a:t>C</a:t>
+            </a:r>
+            <a:r>
+              <a:rPr lang="en-US" dirty="0" smtClean="0"/>
+              <a:t>onstructor C++ 11</a:t>
+            </a:r>
+            <a:endParaRPr lang="en-US" dirty="0"/>
+          </a:p>
+        </p:txBody>
+      </p:sp>
+      <p:sp>
+        <p:nvSpPr>
+          <p:cNvPr id="3" name="Content Placeholder 2"/>
+          <p:cNvSpPr>
+            <a:spLocks noGrp="1"/>
+          </p:cNvSpPr>
+          <p:nvPr>
+            <p:ph idx="1"/>
+          </p:nvPr>
+        </p:nvSpPr>
+        <p:spPr/>
+        <p:txBody>
+          <a:bodyPr/>
+          <a:lstStyle/>
+          <a:p>
+            <a:pPr marL="0" indent="0">
+              <a:buNone/>
+            </a:pPr>
+            <a:r>
+              <a:rPr lang="en-US" dirty="0"/>
+              <a:t> </a:t>
+            </a:r>
+            <a:r>
+              <a:rPr lang="en-US" dirty="0" smtClean="0"/>
+              <a:t>   Operation(Operation&amp;&amp; </a:t>
+            </a:r>
+            <a:r>
+              <a:rPr lang="en-US" dirty="0" err="1" smtClean="0"/>
+              <a:t>rhs</a:t>
+            </a:r>
+            <a:r>
+              <a:rPr lang="en-US" dirty="0" smtClean="0"/>
+              <a:t>) : Operation() {</a:t>
+            </a:r>
+          </a:p>
+          <a:p>
+            <a:pPr marL="0" indent="0">
+              <a:buNone/>
+            </a:pPr>
+            <a:r>
+              <a:rPr lang="en-US" dirty="0" smtClean="0"/>
+              <a:t>        swap(*this, </a:t>
+            </a:r>
+            <a:r>
+              <a:rPr lang="en-US" dirty="0" err="1" smtClean="0"/>
+              <a:t>rhs</a:t>
+            </a:r>
+            <a:r>
+              <a:rPr lang="en-US" dirty="0" smtClean="0"/>
+              <a:t>);</a:t>
+            </a:r>
+          </a:p>
+          <a:p>
+            <a:pPr marL="0" indent="0">
+              <a:buNone/>
+            </a:pPr>
+            <a:r>
+              <a:rPr lang="en-US" dirty="0" smtClean="0"/>
+              <a:t>    }</a:t>
+            </a:r>
+            <a:endParaRPr lang="en-US" dirty="0"/>
+          </a:p>
+        </p:txBody>
+      </p:sp>
+    </p:spTree>
+    <p:extLst>
+      <p:ext uri="{BB962C8B-B14F-4D97-AF65-F5344CB8AC3E}">
+        <p14:creationId xmlns:p14="http://schemas.microsoft.com/office/powerpoint/2010/main" val="4207127892"/>
+      </p:ext>
+    </p:extLst>
+  </p:cSld>
+  <p:clrMapOvr>
+    <a:masterClrMapping/>
+  </p:clrMapOvr>
+  <p:timing>
+    <p:tnLst>
+      <p:par>
+        <p:cTn id="1" dur="indefinite" restart="never" nodeType="tmRoot"/>
+      </p:par>
+    </p:tnLst>
+  </p:timing>
+</p:sld>
+</file>
+
+<file path=ppt/slides/slide39.xml><?xml version="1.0" encoding="utf-8"?>
+<p:sld xmlns:a="http://schemas.openxmlformats.org/drawingml/2006/main" xmlns:r="http://schemas.openxmlformats.org/officeDocument/2006/relationships" xmlns:p="http://schemas.openxmlformats.org/presentationml/2006/main">
+  <p:cSld>
+    <p:spTree>
+      <p:nvGrpSpPr>
+        <p:cNvPr id="1" name=""/>
+        <p:cNvGrpSpPr/>
+        <p:nvPr/>
+      </p:nvGrpSpPr>
+      <p:grpSpPr>
+        <a:xfrm>
+          <a:off x="0" y="0"/>
+          <a:ext cx="0" cy="0"/>
+          <a:chOff x="0" y="0"/>
+          <a:chExt cx="0" cy="0"/>
+        </a:xfrm>
+      </p:grpSpPr>
+      <p:sp>
+        <p:nvSpPr>
+          <p:cNvPr id="2" name="Title 1"/>
+          <p:cNvSpPr>
+            <a:spLocks noGrp="1"/>
+          </p:cNvSpPr>
+          <p:nvPr>
+            <p:ph type="title"/>
+          </p:nvPr>
+        </p:nvSpPr>
+        <p:spPr/>
+        <p:txBody>
+          <a:bodyPr/>
+          <a:lstStyle/>
+          <a:p>
+            <a:endParaRPr lang="en-US"/>
+          </a:p>
+        </p:txBody>
+      </p:sp>
+      <p:sp>
+        <p:nvSpPr>
+          <p:cNvPr id="3" name="Content Placeholder 2"/>
+          <p:cNvSpPr>
+            <a:spLocks noGrp="1"/>
+          </p:cNvSpPr>
+          <p:nvPr>
+            <p:ph idx="1"/>
+          </p:nvPr>
+        </p:nvSpPr>
+        <p:spPr/>
+        <p:txBody>
+          <a:bodyPr/>
+          <a:lstStyle/>
+          <a:p>
+            <a:endParaRPr lang="en-US"/>
+          </a:p>
+        </p:txBody>
+      </p:sp>
+    </p:spTree>
+    <p:extLst>
+      <p:ext uri="{BB962C8B-B14F-4D97-AF65-F5344CB8AC3E}">
+        <p14:creationId xmlns:p14="http://schemas.microsoft.com/office/powerpoint/2010/main" val="3427927982"/>
       </p:ext>
     </p:extLst>
   </p:cSld>
@@ -8275,6 +9271,711 @@
     <p:extLst>
       <p:ext uri="{BB962C8B-B14F-4D97-AF65-F5344CB8AC3E}">
         <p14:creationId xmlns:p14="http://schemas.microsoft.com/office/powerpoint/2010/main" val="1762063876"/>
+      </p:ext>
+    </p:extLst>
+  </p:cSld>
+  <p:clrMapOvr>
+    <a:masterClrMapping/>
+  </p:clrMapOvr>
+  <p:timing>
+    <p:tnLst>
+      <p:par>
+        <p:cTn id="1" dur="indefinite" restart="never" nodeType="tmRoot"/>
+      </p:par>
+    </p:tnLst>
+  </p:timing>
+</p:sld>
+</file>
+
+<file path=ppt/slides/slide40.xml><?xml version="1.0" encoding="utf-8"?>
+<p:sld xmlns:a="http://schemas.openxmlformats.org/drawingml/2006/main" xmlns:r="http://schemas.openxmlformats.org/officeDocument/2006/relationships" xmlns:p="http://schemas.openxmlformats.org/presentationml/2006/main">
+  <p:cSld>
+    <p:spTree>
+      <p:nvGrpSpPr>
+        <p:cNvPr id="1" name=""/>
+        <p:cNvGrpSpPr/>
+        <p:nvPr/>
+      </p:nvGrpSpPr>
+      <p:grpSpPr>
+        <a:xfrm>
+          <a:off x="0" y="0"/>
+          <a:ext cx="0" cy="0"/>
+          <a:chOff x="0" y="0"/>
+          <a:chExt cx="0" cy="0"/>
+        </a:xfrm>
+      </p:grpSpPr>
+      <p:sp>
+        <p:nvSpPr>
+          <p:cNvPr id="2" name="Title 1"/>
+          <p:cNvSpPr>
+            <a:spLocks noGrp="1"/>
+          </p:cNvSpPr>
+          <p:nvPr>
+            <p:ph type="title"/>
+          </p:nvPr>
+        </p:nvSpPr>
+        <p:spPr/>
+        <p:txBody>
+          <a:bodyPr/>
+          <a:lstStyle/>
+          <a:p>
+            <a:r>
+              <a:rPr lang="en-US" altLang="zh-CN" dirty="0" smtClean="0"/>
+              <a:t>R</a:t>
+            </a:r>
+            <a:r>
+              <a:rPr lang="en-US" dirty="0" smtClean="0"/>
+              <a:t>ule of </a:t>
+            </a:r>
+            <a:r>
+              <a:rPr lang="en-US" altLang="zh-CN" dirty="0" smtClean="0"/>
+              <a:t>T</a:t>
+            </a:r>
+            <a:r>
+              <a:rPr lang="en-US" dirty="0" smtClean="0"/>
+              <a:t>hree (</a:t>
+            </a:r>
+            <a:r>
+              <a:rPr lang="en-US" dirty="0" smtClean="0"/>
+              <a:t>Prior to C++11</a:t>
+            </a:r>
+            <a:r>
+              <a:rPr lang="en-US" dirty="0" smtClean="0"/>
+              <a:t>)</a:t>
+            </a:r>
+            <a:endParaRPr lang="en-US" dirty="0"/>
+          </a:p>
+        </p:txBody>
+      </p:sp>
+      <p:sp>
+        <p:nvSpPr>
+          <p:cNvPr id="3" name="Content Placeholder 2"/>
+          <p:cNvSpPr>
+            <a:spLocks noGrp="1"/>
+          </p:cNvSpPr>
+          <p:nvPr>
+            <p:ph idx="1"/>
+          </p:nvPr>
+        </p:nvSpPr>
+        <p:spPr/>
+        <p:txBody>
+          <a:bodyPr>
+            <a:normAutofit/>
+          </a:bodyPr>
+          <a:lstStyle/>
+          <a:p>
+            <a:r>
+              <a:rPr lang="en-US" dirty="0" smtClean="0"/>
+              <a:t>also known as the Law of The Big Three or The Big Three</a:t>
+            </a:r>
+          </a:p>
+          <a:p>
+            <a:r>
+              <a:rPr lang="en-US" dirty="0" smtClean="0"/>
+              <a:t>if a class defines one (or more) of the following it should probably explicitly define all three:</a:t>
+            </a:r>
+          </a:p>
+          <a:p>
+            <a:pPr lvl="1"/>
+            <a:r>
+              <a:rPr lang="en-US" dirty="0" smtClean="0"/>
+              <a:t>destructor</a:t>
+            </a:r>
+          </a:p>
+          <a:p>
+            <a:pPr lvl="1"/>
+            <a:r>
+              <a:rPr lang="en-US" dirty="0" smtClean="0"/>
+              <a:t>copy constructor</a:t>
+            </a:r>
+          </a:p>
+          <a:p>
+            <a:pPr lvl="1"/>
+            <a:r>
+              <a:rPr lang="en-US" dirty="0" smtClean="0"/>
+              <a:t>copy assignment operator</a:t>
+            </a:r>
+          </a:p>
+          <a:p>
+            <a:r>
+              <a:rPr lang="en-US" dirty="0"/>
+              <a:t>R</a:t>
+            </a:r>
+            <a:r>
+              <a:rPr lang="en-US" dirty="0" smtClean="0"/>
+              <a:t>ule of Five </a:t>
+            </a:r>
+            <a:r>
+              <a:rPr lang="en-US" dirty="0"/>
+              <a:t>(</a:t>
+            </a:r>
+            <a:r>
+              <a:rPr lang="en-US" dirty="0" smtClean="0"/>
+              <a:t>C++ 11):</a:t>
+            </a:r>
+          </a:p>
+          <a:p>
+            <a:pPr lvl="1"/>
+            <a:r>
+              <a:rPr lang="en-US" dirty="0" smtClean="0"/>
+              <a:t>copy assignment operator</a:t>
+            </a:r>
+          </a:p>
+          <a:p>
+            <a:pPr lvl="1"/>
+            <a:r>
+              <a:rPr lang="en-US" dirty="0" smtClean="0"/>
+              <a:t>move assignment operator</a:t>
+            </a:r>
+            <a:endParaRPr lang="en-US" dirty="0"/>
+          </a:p>
+        </p:txBody>
+      </p:sp>
+    </p:spTree>
+    <p:extLst>
+      <p:ext uri="{BB962C8B-B14F-4D97-AF65-F5344CB8AC3E}">
+        <p14:creationId xmlns:p14="http://schemas.microsoft.com/office/powerpoint/2010/main" val="715365882"/>
+      </p:ext>
+    </p:extLst>
+  </p:cSld>
+  <p:clrMapOvr>
+    <a:masterClrMapping/>
+  </p:clrMapOvr>
+  <p:timing>
+    <p:tnLst>
+      <p:par>
+        <p:cTn id="1" dur="indefinite" restart="never" nodeType="tmRoot"/>
+      </p:par>
+    </p:tnLst>
+  </p:timing>
+</p:sld>
+</file>
+
+<file path=ppt/slides/slide41.xml><?xml version="1.0" encoding="utf-8"?>
+<p:sld xmlns:a="http://schemas.openxmlformats.org/drawingml/2006/main" xmlns:r="http://schemas.openxmlformats.org/officeDocument/2006/relationships" xmlns:p="http://schemas.openxmlformats.org/presentationml/2006/main">
+  <p:cSld>
+    <p:spTree>
+      <p:nvGrpSpPr>
+        <p:cNvPr id="1" name=""/>
+        <p:cNvGrpSpPr/>
+        <p:nvPr/>
+      </p:nvGrpSpPr>
+      <p:grpSpPr>
+        <a:xfrm>
+          <a:off x="0" y="0"/>
+          <a:ext cx="0" cy="0"/>
+          <a:chOff x="0" y="0"/>
+          <a:chExt cx="0" cy="0"/>
+        </a:xfrm>
+      </p:grpSpPr>
+      <p:sp>
+        <p:nvSpPr>
+          <p:cNvPr id="2" name="Title 1"/>
+          <p:cNvSpPr>
+            <a:spLocks noGrp="1"/>
+          </p:cNvSpPr>
+          <p:nvPr>
+            <p:ph type="title"/>
+          </p:nvPr>
+        </p:nvSpPr>
+        <p:spPr/>
+        <p:txBody>
+          <a:bodyPr/>
+          <a:lstStyle/>
+          <a:p>
+            <a:r>
+              <a:rPr lang="sv-SE" dirty="0" smtClean="0"/>
+              <a:t>Explicitly disallow the use of compiler-generated functions you do not want.</a:t>
+            </a:r>
+            <a:endParaRPr lang="sv-SE" dirty="0" smtClean="0"/>
+          </a:p>
+        </p:txBody>
+      </p:sp>
+      <p:sp>
+        <p:nvSpPr>
+          <p:cNvPr id="3" name="Content Placeholder 2"/>
+          <p:cNvSpPr>
+            <a:spLocks noGrp="1"/>
+          </p:cNvSpPr>
+          <p:nvPr>
+            <p:ph idx="1"/>
+          </p:nvPr>
+        </p:nvSpPr>
+        <p:spPr/>
+        <p:txBody>
+          <a:bodyPr>
+            <a:normAutofit/>
+          </a:bodyPr>
+          <a:lstStyle/>
+          <a:p>
+            <a:pPr marL="0" indent="0">
+              <a:buNone/>
+            </a:pPr>
+            <a:r>
+              <a:rPr lang="sv-SE" dirty="0" smtClean="0"/>
+              <a:t>Example: Do not want an object to be copied</a:t>
+            </a:r>
+          </a:p>
+          <a:p>
+            <a:pPr marL="0" indent="0">
+              <a:buNone/>
+            </a:pPr>
+            <a:endParaRPr lang="sv-SE" dirty="0" smtClean="0"/>
+          </a:p>
+        </p:txBody>
+      </p:sp>
+    </p:spTree>
+    <p:extLst>
+      <p:ext uri="{BB962C8B-B14F-4D97-AF65-F5344CB8AC3E}">
+        <p14:creationId xmlns:p14="http://schemas.microsoft.com/office/powerpoint/2010/main" val="3058684884"/>
+      </p:ext>
+    </p:extLst>
+  </p:cSld>
+  <p:clrMapOvr>
+    <a:masterClrMapping/>
+  </p:clrMapOvr>
+  <p:timing>
+    <p:tnLst>
+      <p:par>
+        <p:cTn id="1" dur="indefinite" restart="never" nodeType="tmRoot"/>
+      </p:par>
+    </p:tnLst>
+  </p:timing>
+</p:sld>
+</file>
+
+<file path=ppt/slides/slide42.xml><?xml version="1.0" encoding="utf-8"?>
+<p:sld xmlns:a="http://schemas.openxmlformats.org/drawingml/2006/main" xmlns:r="http://schemas.openxmlformats.org/officeDocument/2006/relationships" xmlns:p="http://schemas.openxmlformats.org/presentationml/2006/main">
+  <p:cSld>
+    <p:spTree>
+      <p:nvGrpSpPr>
+        <p:cNvPr id="1" name=""/>
+        <p:cNvGrpSpPr/>
+        <p:nvPr/>
+      </p:nvGrpSpPr>
+      <p:grpSpPr>
+        <a:xfrm>
+          <a:off x="0" y="0"/>
+          <a:ext cx="0" cy="0"/>
+          <a:chOff x="0" y="0"/>
+          <a:chExt cx="0" cy="0"/>
+        </a:xfrm>
+      </p:grpSpPr>
+      <p:sp>
+        <p:nvSpPr>
+          <p:cNvPr id="2" name="Title 1"/>
+          <p:cNvSpPr>
+            <a:spLocks noGrp="1"/>
+          </p:cNvSpPr>
+          <p:nvPr>
+            <p:ph type="title"/>
+          </p:nvPr>
+        </p:nvSpPr>
+        <p:spPr/>
+        <p:txBody>
+          <a:bodyPr/>
+          <a:lstStyle/>
+          <a:p>
+            <a:r>
+              <a:rPr lang="sv-SE" dirty="0" smtClean="0"/>
+              <a:t>Solution 1</a:t>
+            </a:r>
+            <a:endParaRPr lang="en-US" dirty="0"/>
+          </a:p>
+        </p:txBody>
+      </p:sp>
+      <p:sp>
+        <p:nvSpPr>
+          <p:cNvPr id="3" name="Content Placeholder 2"/>
+          <p:cNvSpPr>
+            <a:spLocks noGrp="1"/>
+          </p:cNvSpPr>
+          <p:nvPr>
+            <p:ph idx="1"/>
+          </p:nvPr>
+        </p:nvSpPr>
+        <p:spPr/>
+        <p:txBody>
+          <a:bodyPr>
+            <a:normAutofit fontScale="92500" lnSpcReduction="20000"/>
+          </a:bodyPr>
+          <a:lstStyle/>
+          <a:p>
+            <a:pPr marL="0" indent="0">
+              <a:buNone/>
+            </a:pPr>
+            <a:r>
+              <a:rPr lang="sv-SE" dirty="0" smtClean="0"/>
+              <a:t>Declare copy constructor and assignment operator to be private (and do not define them)</a:t>
+            </a:r>
+          </a:p>
+          <a:p>
+            <a:pPr marL="0" indent="0">
+              <a:buNone/>
+            </a:pPr>
+            <a:r>
+              <a:rPr lang="sv-SE" dirty="0" smtClean="0"/>
+              <a:t>class Uncopyable {</a:t>
+            </a:r>
+          </a:p>
+          <a:p>
+            <a:pPr marL="0" indent="0">
+              <a:buNone/>
+            </a:pPr>
+            <a:r>
+              <a:rPr lang="sv-SE" dirty="0" smtClean="0"/>
+              <a:t>private:</a:t>
+            </a:r>
+          </a:p>
+          <a:p>
+            <a:pPr marL="0" indent="0">
+              <a:buNone/>
+            </a:pPr>
+            <a:r>
+              <a:rPr lang="sv-SE" dirty="0" smtClean="0"/>
+              <a:t>  Uncopyable(const Uncopyable&amp;);</a:t>
+            </a:r>
+          </a:p>
+          <a:p>
+            <a:pPr marL="0" indent="0">
+              <a:buNone/>
+            </a:pPr>
+            <a:r>
+              <a:rPr lang="sv-SE" dirty="0" smtClean="0"/>
+              <a:t>  Uncopyable&amp; operator=(const Uncopyable&amp;);</a:t>
+            </a:r>
+          </a:p>
+          <a:p>
+            <a:pPr marL="0" indent="0">
+              <a:buNone/>
+            </a:pPr>
+            <a:r>
+              <a:rPr lang="sv-SE" dirty="0" smtClean="0"/>
+              <a:t>} </a:t>
+            </a:r>
+          </a:p>
+          <a:p>
+            <a:pPr marL="0" indent="0">
+              <a:buNone/>
+            </a:pPr>
+            <a:r>
+              <a:rPr lang="sv-SE" dirty="0" smtClean="0"/>
+              <a:t>Note: </a:t>
+            </a:r>
+          </a:p>
+          <a:p>
+            <a:pPr marL="0" indent="0">
+              <a:buNone/>
+            </a:pPr>
+            <a:r>
+              <a:rPr lang="sv-SE" dirty="0" smtClean="0"/>
+              <a:t>MTAS/TSP, needs to implement all functions/methods because the compiler could not detect error for calling a declared but not defined class method during compilation time, but indeed result in CA during runtime.</a:t>
+            </a:r>
+            <a:endParaRPr lang="sv-SE" dirty="0" smtClean="0"/>
+          </a:p>
+          <a:p>
+            <a:endParaRPr lang="en-US" dirty="0"/>
+          </a:p>
+        </p:txBody>
+      </p:sp>
+    </p:spTree>
+    <p:extLst>
+      <p:ext uri="{BB962C8B-B14F-4D97-AF65-F5344CB8AC3E}">
+        <p14:creationId xmlns:p14="http://schemas.microsoft.com/office/powerpoint/2010/main" val="1662578072"/>
+      </p:ext>
+    </p:extLst>
+  </p:cSld>
+  <p:clrMapOvr>
+    <a:masterClrMapping/>
+  </p:clrMapOvr>
+  <p:timing>
+    <p:tnLst>
+      <p:par>
+        <p:cTn id="1" dur="indefinite" restart="never" nodeType="tmRoot"/>
+      </p:par>
+    </p:tnLst>
+  </p:timing>
+</p:sld>
+</file>
+
+<file path=ppt/slides/slide43.xml><?xml version="1.0" encoding="utf-8"?>
+<p:sld xmlns:a="http://schemas.openxmlformats.org/drawingml/2006/main" xmlns:r="http://schemas.openxmlformats.org/officeDocument/2006/relationships" xmlns:p="http://schemas.openxmlformats.org/presentationml/2006/main">
+  <p:cSld>
+    <p:spTree>
+      <p:nvGrpSpPr>
+        <p:cNvPr id="1" name=""/>
+        <p:cNvGrpSpPr/>
+        <p:nvPr/>
+      </p:nvGrpSpPr>
+      <p:grpSpPr>
+        <a:xfrm>
+          <a:off x="0" y="0"/>
+          <a:ext cx="0" cy="0"/>
+          <a:chOff x="0" y="0"/>
+          <a:chExt cx="0" cy="0"/>
+        </a:xfrm>
+      </p:grpSpPr>
+      <p:sp>
+        <p:nvSpPr>
+          <p:cNvPr id="2" name="Title 1"/>
+          <p:cNvSpPr>
+            <a:spLocks noGrp="1"/>
+          </p:cNvSpPr>
+          <p:nvPr>
+            <p:ph type="title"/>
+          </p:nvPr>
+        </p:nvSpPr>
+        <p:spPr/>
+        <p:txBody>
+          <a:bodyPr/>
+          <a:lstStyle/>
+          <a:p>
+            <a:r>
+              <a:rPr lang="sv-SE" dirty="0" smtClean="0"/>
+              <a:t>Solution 2</a:t>
+            </a:r>
+            <a:endParaRPr lang="en-US" dirty="0"/>
+          </a:p>
+        </p:txBody>
+      </p:sp>
+      <p:sp>
+        <p:nvSpPr>
+          <p:cNvPr id="3" name="Content Placeholder 2"/>
+          <p:cNvSpPr>
+            <a:spLocks noGrp="1"/>
+          </p:cNvSpPr>
+          <p:nvPr>
+            <p:ph idx="1"/>
+          </p:nvPr>
+        </p:nvSpPr>
+        <p:spPr/>
+        <p:txBody>
+          <a:bodyPr/>
+          <a:lstStyle/>
+          <a:p>
+            <a:r>
+              <a:rPr lang="sv-SE" dirty="0" smtClean="0"/>
+              <a:t>Inherit from an Uncopyable class</a:t>
+            </a:r>
+            <a:br>
+              <a:rPr lang="sv-SE" dirty="0" smtClean="0"/>
+            </a:br>
+            <a:r>
+              <a:rPr lang="sv-SE" dirty="0" smtClean="0"/>
+              <a:t>class A : public Uncopyable {...}</a:t>
+            </a:r>
+            <a:endParaRPr lang="sv-SE" dirty="0"/>
+          </a:p>
+          <a:p>
+            <a:pPr marL="0" indent="0">
+              <a:buNone/>
+            </a:pPr>
+            <a:endParaRPr lang="en-US" dirty="0" smtClean="0"/>
+          </a:p>
+        </p:txBody>
+      </p:sp>
+    </p:spTree>
+    <p:extLst>
+      <p:ext uri="{BB962C8B-B14F-4D97-AF65-F5344CB8AC3E}">
+        <p14:creationId xmlns:p14="http://schemas.microsoft.com/office/powerpoint/2010/main" val="1369380194"/>
+      </p:ext>
+    </p:extLst>
+  </p:cSld>
+  <p:clrMapOvr>
+    <a:masterClrMapping/>
+  </p:clrMapOvr>
+  <p:timing>
+    <p:tnLst>
+      <p:par>
+        <p:cTn id="1" dur="indefinite" restart="never" nodeType="tmRoot"/>
+      </p:par>
+    </p:tnLst>
+  </p:timing>
+</p:sld>
+</file>
+
+<file path=ppt/slides/slide44.xml><?xml version="1.0" encoding="utf-8"?>
+<p:sld xmlns:a="http://schemas.openxmlformats.org/drawingml/2006/main" xmlns:r="http://schemas.openxmlformats.org/officeDocument/2006/relationships" xmlns:p="http://schemas.openxmlformats.org/presentationml/2006/main">
+  <p:cSld>
+    <p:spTree>
+      <p:nvGrpSpPr>
+        <p:cNvPr id="1" name=""/>
+        <p:cNvGrpSpPr/>
+        <p:nvPr/>
+      </p:nvGrpSpPr>
+      <p:grpSpPr>
+        <a:xfrm>
+          <a:off x="0" y="0"/>
+          <a:ext cx="0" cy="0"/>
+          <a:chOff x="0" y="0"/>
+          <a:chExt cx="0" cy="0"/>
+        </a:xfrm>
+      </p:grpSpPr>
+      <p:sp>
+        <p:nvSpPr>
+          <p:cNvPr id="2" name="Title 1"/>
+          <p:cNvSpPr>
+            <a:spLocks noGrp="1"/>
+          </p:cNvSpPr>
+          <p:nvPr>
+            <p:ph type="title"/>
+          </p:nvPr>
+        </p:nvSpPr>
+        <p:spPr/>
+        <p:txBody>
+          <a:bodyPr/>
+          <a:lstStyle/>
+          <a:p>
+            <a:r>
+              <a:rPr lang="sv-SE" dirty="0" smtClean="0"/>
+              <a:t>Con/De-structor and virtual function</a:t>
+            </a:r>
+            <a:endParaRPr lang="en-US" dirty="0"/>
+          </a:p>
+        </p:txBody>
+      </p:sp>
+      <p:sp>
+        <p:nvSpPr>
+          <p:cNvPr id="3" name="Content Placeholder 2"/>
+          <p:cNvSpPr>
+            <a:spLocks noGrp="1"/>
+          </p:cNvSpPr>
+          <p:nvPr>
+            <p:ph idx="1"/>
+          </p:nvPr>
+        </p:nvSpPr>
+        <p:spPr/>
+        <p:txBody>
+          <a:bodyPr/>
+          <a:lstStyle/>
+          <a:p>
+            <a:pPr marL="0" indent="0">
+              <a:buNone/>
+            </a:pPr>
+            <a:r>
+              <a:rPr lang="sv-SE" dirty="0" smtClean="0"/>
+              <a:t>Let’s see a demo. (constructorVirtualFun)</a:t>
+            </a:r>
+            <a:endParaRPr lang="en-US" dirty="0"/>
+          </a:p>
+        </p:txBody>
+      </p:sp>
+    </p:spTree>
+    <p:extLst>
+      <p:ext uri="{BB962C8B-B14F-4D97-AF65-F5344CB8AC3E}">
+        <p14:creationId xmlns:p14="http://schemas.microsoft.com/office/powerpoint/2010/main" val="2597255556"/>
+      </p:ext>
+    </p:extLst>
+  </p:cSld>
+  <p:clrMapOvr>
+    <a:masterClrMapping/>
+  </p:clrMapOvr>
+  <p:timing>
+    <p:tnLst>
+      <p:par>
+        <p:cTn id="1" dur="indefinite" restart="never" nodeType="tmRoot"/>
+      </p:par>
+    </p:tnLst>
+  </p:timing>
+</p:sld>
+</file>
+
+<file path=ppt/slides/slide45.xml><?xml version="1.0" encoding="utf-8"?>
+<p:sld xmlns:a="http://schemas.openxmlformats.org/drawingml/2006/main" xmlns:r="http://schemas.openxmlformats.org/officeDocument/2006/relationships" xmlns:p="http://schemas.openxmlformats.org/presentationml/2006/main">
+  <p:cSld>
+    <p:spTree>
+      <p:nvGrpSpPr>
+        <p:cNvPr id="1" name=""/>
+        <p:cNvGrpSpPr/>
+        <p:nvPr/>
+      </p:nvGrpSpPr>
+      <p:grpSpPr>
+        <a:xfrm>
+          <a:off x="0" y="0"/>
+          <a:ext cx="0" cy="0"/>
+          <a:chOff x="0" y="0"/>
+          <a:chExt cx="0" cy="0"/>
+        </a:xfrm>
+      </p:grpSpPr>
+      <p:sp>
+        <p:nvSpPr>
+          <p:cNvPr id="2" name="Title 1"/>
+          <p:cNvSpPr>
+            <a:spLocks noGrp="1"/>
+          </p:cNvSpPr>
+          <p:nvPr>
+            <p:ph type="title"/>
+          </p:nvPr>
+        </p:nvSpPr>
+        <p:spPr/>
+        <p:txBody>
+          <a:bodyPr/>
+          <a:lstStyle/>
+          <a:p>
+            <a:r>
+              <a:rPr lang="sv-SE" dirty="0" smtClean="0"/>
+              <a:t>Con/De-structor and virtual function</a:t>
+            </a:r>
+            <a:endParaRPr lang="en-US" dirty="0"/>
+          </a:p>
+        </p:txBody>
+      </p:sp>
+      <p:sp>
+        <p:nvSpPr>
+          <p:cNvPr id="3" name="Content Placeholder 2"/>
+          <p:cNvSpPr>
+            <a:spLocks noGrp="1"/>
+          </p:cNvSpPr>
+          <p:nvPr>
+            <p:ph idx="1"/>
+          </p:nvPr>
+        </p:nvSpPr>
+        <p:spPr/>
+        <p:txBody>
+          <a:bodyPr/>
+          <a:lstStyle/>
+          <a:p>
+            <a:r>
+              <a:rPr lang="sv-SE" dirty="0" smtClean="0"/>
+              <a:t>Why pure virtual function is called?</a:t>
+            </a:r>
+          </a:p>
+          <a:p>
+            <a:pPr lvl="1"/>
+            <a:r>
+              <a:rPr lang="sv-SE" dirty="0" smtClean="0"/>
+              <a:t>When constructing a derived object (ReadOperation), base class is constructed first. </a:t>
+            </a:r>
+          </a:p>
+          <a:p>
+            <a:pPr lvl="1"/>
+            <a:r>
+              <a:rPr lang="sv-SE" dirty="0" smtClean="0"/>
+              <a:t>When base constructor (Operator) is called, it could not directly or indirectly call derived class method.</a:t>
+            </a:r>
+            <a:endParaRPr lang="sv-SE" dirty="0"/>
+          </a:p>
+          <a:p>
+            <a:pPr marL="0" indent="0">
+              <a:buNone/>
+            </a:pPr>
+            <a:endParaRPr lang="sv-SE" dirty="0" smtClean="0"/>
+          </a:p>
+          <a:p>
+            <a:pPr marL="0" indent="0">
+              <a:buNone/>
+            </a:pPr>
+            <a:r>
+              <a:rPr lang="sv-SE" dirty="0" smtClean="0"/>
+              <a:t>Do not call virtual functions in constructor or destructor.</a:t>
+            </a:r>
+          </a:p>
+        </p:txBody>
+      </p:sp>
+    </p:spTree>
+    <p:extLst>
+      <p:ext uri="{BB962C8B-B14F-4D97-AF65-F5344CB8AC3E}">
+        <p14:creationId xmlns:p14="http://schemas.microsoft.com/office/powerpoint/2010/main" val="2634333722"/>
       </p:ext>
     </p:extLst>
   </p:cSld>

</xml_diff>